<commit_message>
minor cleanup and update to PPT
</commit_message>
<xml_diff>
--- a/URL Shortener.pptx
+++ b/URL Shortener.pptx
@@ -23,10 +23,13 @@
     <p:sldId id="273" r:id="rId17"/>
     <p:sldId id="279" r:id="rId18"/>
     <p:sldId id="280" r:id="rId19"/>
-    <p:sldId id="271" r:id="rId20"/>
-    <p:sldId id="275" r:id="rId21"/>
-    <p:sldId id="274" r:id="rId22"/>
-    <p:sldId id="276" r:id="rId23"/>
+    <p:sldId id="281" r:id="rId20"/>
+    <p:sldId id="282" r:id="rId21"/>
+    <p:sldId id="283" r:id="rId22"/>
+    <p:sldId id="271" r:id="rId23"/>
+    <p:sldId id="275" r:id="rId24"/>
+    <p:sldId id="274" r:id="rId25"/>
+    <p:sldId id="276" r:id="rId26"/>
   </p:sldIdLst>
   <p:sldSz cx="12192000" cy="6858000"/>
   <p:notesSz cx="6858000" cy="9144000"/>
@@ -125,6 +128,11 @@
       </a:defRPr>
     </a:lvl9pPr>
   </p:defaultTextStyle>
+  <p:extLst>
+    <p:ext uri="{EFAFB233-063F-42B5-8137-9DF3F51BA10A}">
+      <p15:sldGuideLst xmlns:p15="http://schemas.microsoft.com/office/powerpoint/2012/main"/>
+    </p:ext>
+  </p:extLst>
 </p:presentation>
 </file>
 
@@ -5846,15 +5854,50 @@
             <a:pPr algn="ctr"/>
             <a:r>
               <a:rPr lang="en-US" dirty="0"/>
-              <a:t>An overview of the considerations and implementation details for building a URL </a:t>
-            </a:r>
-            <a:r>
-              <a:rPr lang="en-US" dirty="0" err="1"/>
-              <a:t>shortener</a:t>
-            </a:r>
-            <a:r>
-              <a:rPr lang="en-US" dirty="0"/>
-              <a:t> service. </a:t>
+              <a:t>An overview of the considerations and implementation details for building a URL shortening service. </a:t>
+            </a:r>
+          </a:p>
+        </p:txBody>
+      </p:sp>
+      <p:sp>
+        <p:nvSpPr>
+          <p:cNvPr id="4" name="TextBox 3">
+            <a:extLst>
+              <a:ext uri="{FF2B5EF4-FFF2-40B4-BE49-F238E27FC236}">
+                <a16:creationId xmlns:a16="http://schemas.microsoft.com/office/drawing/2014/main" id="{AE7F4BD6-75C2-7749-9B97-DD1C253D9AEC}"/>
+              </a:ext>
+            </a:extLst>
+          </p:cNvPr>
+          <p:cNvSpPr txBox="1"/>
+          <p:nvPr/>
+        </p:nvSpPr>
+        <p:spPr>
+          <a:xfrm>
+            <a:off x="4129227" y="5817140"/>
+            <a:ext cx="2522614" cy="707886"/>
+          </a:xfrm>
+          <a:prstGeom prst="rect">
+            <a:avLst/>
+          </a:prstGeom>
+          <a:noFill/>
+        </p:spPr>
+        <p:txBody>
+          <a:bodyPr wrap="none" rtlCol="0">
+            <a:spAutoFit/>
+          </a:bodyPr>
+          <a:lstStyle/>
+          <a:p>
+            <a:pPr algn="ctr"/>
+            <a:r>
+              <a:rPr lang="en-US" sz="2000" dirty="0"/>
+              <a:t>Presented by Bin Liu</a:t>
+            </a:r>
+          </a:p>
+          <a:p>
+            <a:pPr algn="ctr"/>
+            <a:r>
+              <a:rPr lang="en-US" sz="2000" dirty="0"/>
+              <a:t>Version 1</a:t>
             </a:r>
           </a:p>
         </p:txBody>
@@ -6442,15 +6485,7 @@
             <a:pPr lvl="1" algn="just" fontAlgn="base"/>
             <a:r>
               <a:rPr lang="en-US" sz="1400" dirty="0"/>
-              <a:t>When building a URL </a:t>
-            </a:r>
-            <a:r>
-              <a:rPr lang="en-US" sz="1400" dirty="0" err="1"/>
-              <a:t>shortener</a:t>
-            </a:r>
-            <a:r>
-              <a:rPr lang="en-US" sz="1400" dirty="0"/>
-              <a:t> service, you might wonder whether to use </a:t>
+              <a:t>When building a URL shortening service, you might wonder whether to use </a:t>
             </a:r>
             <a:r>
               <a:rPr lang="en-US" sz="1400" b="1" dirty="0"/>
@@ -7504,28 +7539,28 @@
           </a:bodyPr>
           <a:lstStyle/>
           <a:p>
+            <a:pPr lvl="1" fontAlgn="base"/>
+            <a:r>
+              <a:rPr lang="en-US" dirty="0"/>
+              <a:t>Considerations for POST or GET of encode and decode</a:t>
+            </a:r>
+          </a:p>
+          <a:p>
             <a:pPr lvl="2" fontAlgn="base"/>
             <a:r>
               <a:rPr lang="en-US" dirty="0"/>
-              <a:t>Considerations for POST or GET of encode and decode</a:t>
+              <a:t>Encode:</a:t>
             </a:r>
           </a:p>
           <a:p>
             <a:pPr lvl="3" fontAlgn="base"/>
             <a:r>
               <a:rPr lang="en-US" dirty="0"/>
-              <a:t>Encode:</a:t>
+              <a:t>Use POST:</a:t>
             </a:r>
           </a:p>
           <a:p>
             <a:pPr lvl="4" fontAlgn="base"/>
-            <a:r>
-              <a:rPr lang="en-US" dirty="0"/>
-              <a:t>Use POST:</a:t>
-            </a:r>
-          </a:p>
-          <a:p>
-            <a:pPr lvl="5" fontAlgn="base"/>
             <a:r>
               <a:rPr lang="en-US" b="1" dirty="0"/>
               <a:t>Data Size:</a:t>
@@ -7536,7 +7571,7 @@
             </a:r>
           </a:p>
           <a:p>
-            <a:pPr lvl="5" fontAlgn="base"/>
+            <a:pPr lvl="4" fontAlgn="base"/>
             <a:r>
               <a:rPr lang="en-US" b="1" dirty="0"/>
               <a:t>Security:</a:t>
@@ -7547,7 +7582,7 @@
             </a:r>
           </a:p>
           <a:p>
-            <a:pPr lvl="5" fontAlgn="base"/>
+            <a:pPr lvl="4" fontAlgn="base"/>
             <a:r>
               <a:rPr lang="en-US" b="1" dirty="0"/>
               <a:t>Semantics:</a:t>
@@ -7651,28 +7686,28 @@
           </a:bodyPr>
           <a:lstStyle/>
           <a:p>
+            <a:pPr lvl="1" fontAlgn="base"/>
+            <a:r>
+              <a:rPr lang="en-US" dirty="0"/>
+              <a:t>Considerations for POST or GET of encode and decode</a:t>
+            </a:r>
+          </a:p>
+          <a:p>
             <a:pPr lvl="2" fontAlgn="base"/>
             <a:r>
               <a:rPr lang="en-US" dirty="0"/>
-              <a:t>Considerations for POST or GET of encode and decode</a:t>
+              <a:t>Decode:</a:t>
             </a:r>
           </a:p>
           <a:p>
             <a:pPr lvl="3" fontAlgn="base"/>
             <a:r>
               <a:rPr lang="en-US" dirty="0"/>
-              <a:t>Decode:</a:t>
+              <a:t>USE GET:</a:t>
             </a:r>
           </a:p>
           <a:p>
             <a:pPr lvl="4" fontAlgn="base"/>
-            <a:r>
-              <a:rPr lang="en-US" dirty="0"/>
-              <a:t>USE GET:</a:t>
-            </a:r>
-          </a:p>
-          <a:p>
-            <a:pPr lvl="5" fontAlgn="base"/>
             <a:r>
               <a:rPr lang="en-US" b="1" dirty="0"/>
               <a:t>Semantics:</a:t>
@@ -7683,7 +7718,7 @@
             </a:r>
           </a:p>
           <a:p>
-            <a:pPr lvl="5" fontAlgn="base"/>
+            <a:pPr lvl="4" fontAlgn="base"/>
             <a:r>
               <a:rPr lang="en-US" b="1" dirty="0"/>
               <a:t>Simplicity:</a:t>
@@ -7694,7 +7729,7 @@
             </a:r>
           </a:p>
           <a:p>
-            <a:pPr lvl="5" fontAlgn="base"/>
+            <a:pPr lvl="4" fontAlgn="base"/>
             <a:r>
               <a:rPr lang="en-US" b="1" dirty="0"/>
               <a:t>Caching:</a:t>
@@ -7705,14 +7740,14 @@
             </a:r>
           </a:p>
           <a:p>
+            <a:pPr lvl="2" fontAlgn="base"/>
+            <a:r>
+              <a:rPr lang="en-US" dirty="0"/>
+              <a:t>Summary:</a:t>
+            </a:r>
+          </a:p>
+          <a:p>
             <a:pPr lvl="3" fontAlgn="base"/>
-            <a:r>
-              <a:rPr lang="en-US" dirty="0"/>
-              <a:t>Summary:</a:t>
-            </a:r>
-          </a:p>
-          <a:p>
-            <a:pPr lvl="4" fontAlgn="base"/>
             <a:r>
               <a:rPr lang="en-US" dirty="0"/>
               <a:t>In most cases, you should use POST for encoding and GET for decoding. This approach leverages the strengths of each method and adheres to RESTful principles.</a:t>
@@ -7827,100 +7862,100 @@
             <a:pPr lvl="1" fontAlgn="base"/>
             <a:r>
               <a:rPr lang="en-US" sz="2900" dirty="0"/>
-              <a:t>Considerations whether to add authentication to encode and decode</a:t>
+              <a:t>Considerations for whether to add authentication to encode and decode</a:t>
             </a:r>
           </a:p>
           <a:p>
             <a:pPr lvl="2" fontAlgn="base"/>
             <a:r>
-              <a:rPr lang="en-US" sz="2500" dirty="0"/>
+              <a:rPr lang="en-US" sz="2800" dirty="0"/>
               <a:t>Reasons to require Authentication:</a:t>
             </a:r>
           </a:p>
           <a:p>
             <a:pPr lvl="3" fontAlgn="base"/>
             <a:r>
-              <a:rPr lang="en-US" sz="2500" dirty="0"/>
+              <a:rPr lang="en-US" sz="2800" dirty="0"/>
               <a:t>Security</a:t>
             </a:r>
           </a:p>
           <a:p>
             <a:pPr lvl="4" fontAlgn="base"/>
             <a:r>
-              <a:rPr lang="en-US" sz="2500" b="1" dirty="0"/>
+              <a:rPr lang="en-US" sz="2800" b="1" dirty="0"/>
               <a:t>Prevent Abuse:</a:t>
             </a:r>
             <a:r>
-              <a:rPr lang="en-US" sz="2500" dirty="0"/>
+              <a:rPr lang="en-US" sz="2800" dirty="0"/>
               <a:t> Authentication can prevent misuse of the service, such as creating a large number of shortened URLs for spam or phishing purposes.</a:t>
             </a:r>
           </a:p>
           <a:p>
             <a:pPr lvl="4" fontAlgn="base"/>
             <a:r>
-              <a:rPr lang="en-US" sz="2500" b="1" dirty="0"/>
+              <a:rPr lang="en-US" sz="2800" b="1" dirty="0"/>
               <a:t>Access Control:</a:t>
             </a:r>
             <a:r>
-              <a:rPr lang="en-US" sz="2500" dirty="0"/>
+              <a:rPr lang="en-US" sz="2800" dirty="0"/>
               <a:t> You can control who has access to the service, ensuring only authorized users can shorten URLs or decode them.</a:t>
             </a:r>
           </a:p>
           <a:p>
             <a:pPr lvl="3" fontAlgn="base"/>
             <a:r>
-              <a:rPr lang="en-US" sz="2500" dirty="0"/>
+              <a:rPr lang="en-US" sz="2800" dirty="0"/>
               <a:t>Usage Tracking</a:t>
             </a:r>
           </a:p>
           <a:p>
             <a:pPr lvl="4" fontAlgn="base"/>
             <a:r>
-              <a:rPr lang="en-US" sz="2500" b="1" dirty="0"/>
+              <a:rPr lang="en-US" sz="2800" b="1" dirty="0"/>
               <a:t>User-Based Analytics:</a:t>
             </a:r>
             <a:r>
-              <a:rPr lang="en-US" sz="2500" dirty="0"/>
+              <a:rPr lang="en-US" sz="2800" dirty="0"/>
               <a:t> If you want to track usage per user, authentication allows you to attribute activity to specific users.</a:t>
             </a:r>
           </a:p>
           <a:p>
             <a:pPr lvl="4" fontAlgn="base"/>
             <a:r>
-              <a:rPr lang="en-US" sz="2500" b="1" dirty="0"/>
+              <a:rPr lang="en-US" sz="2800" b="1" dirty="0"/>
               <a:t>Quota Management:</a:t>
             </a:r>
             <a:r>
-              <a:rPr lang="en-US" sz="2500" dirty="0"/>
+              <a:rPr lang="en-US" sz="2800" dirty="0"/>
               <a:t> You can implement quotas to limit the number of URLs a user can shorten or decode within a certain period.</a:t>
             </a:r>
           </a:p>
           <a:p>
             <a:pPr lvl="3" fontAlgn="base"/>
             <a:r>
-              <a:rPr lang="en-US" sz="2500" dirty="0"/>
+              <a:rPr lang="en-US" sz="2800" dirty="0"/>
               <a:t>Customization and Personalization</a:t>
             </a:r>
           </a:p>
           <a:p>
             <a:pPr lvl="4" fontAlgn="base"/>
             <a:r>
-              <a:rPr lang="en-US" sz="2500" b="1" dirty="0"/>
+              <a:rPr lang="en-US" sz="2800" b="1" dirty="0"/>
               <a:t>User Preferences:</a:t>
             </a:r>
             <a:r>
-              <a:rPr lang="en-US" sz="2500" dirty="0"/>
+              <a:rPr lang="en-US" sz="2800" dirty="0"/>
               <a:t> Allow users to save preferences or manage their shortened URLs.</a:t>
             </a:r>
           </a:p>
           <a:p>
             <a:pPr lvl="4" fontAlgn="base"/>
             <a:r>
-              <a:rPr lang="en-US" sz="2500" b="1" dirty="0"/>
+              <a:rPr lang="en-US" sz="2800" b="1" dirty="0"/>
               <a:t>Feature Access:</a:t>
             </a:r>
             <a:r>
-              <a:rPr lang="en-US" sz="2500" dirty="0"/>
+              <a:rPr lang="en-US" sz="2800" dirty="0"/>
               <a:t> Provide different levels of service or features based on user roles.</a:t>
             </a:r>
           </a:p>
@@ -8026,101 +8061,95 @@
         </p:spPr>
         <p:txBody>
           <a:bodyPr>
-            <a:normAutofit fontScale="47500" lnSpcReduction="20000"/>
+            <a:normAutofit fontScale="92500" lnSpcReduction="10000"/>
           </a:bodyPr>
           <a:lstStyle/>
           <a:p>
             <a:pPr lvl="1" fontAlgn="base"/>
             <a:r>
-              <a:rPr lang="en-US" sz="2900" dirty="0"/>
-              <a:t>Considerations whether to add authentication to encode and decode</a:t>
+              <a:rPr lang="en-US" sz="1300" dirty="0"/>
+              <a:t>Considerations for whether to add authentication to encode and decode</a:t>
             </a:r>
           </a:p>
           <a:p>
             <a:pPr lvl="2" fontAlgn="base"/>
             <a:r>
-              <a:rPr lang="en-US" sz="2500" dirty="0"/>
+              <a:rPr lang="en-US" sz="1200" dirty="0"/>
               <a:t>Reasons </a:t>
             </a:r>
             <a:r>
-              <a:rPr lang="en-US" sz="2500" b="1" dirty="0"/>
+              <a:rPr lang="en-US" sz="1200" b="1" dirty="0"/>
               <a:t>NOT</a:t>
             </a:r>
             <a:r>
-              <a:rPr lang="en-US" sz="2500" dirty="0"/>
+              <a:rPr lang="en-US" sz="1200" dirty="0"/>
               <a:t> to require Authentication:</a:t>
             </a:r>
           </a:p>
           <a:p>
             <a:pPr lvl="3" fontAlgn="base"/>
             <a:r>
-              <a:rPr lang="en-US" sz="2800" dirty="0"/>
+              <a:rPr lang="en-US" dirty="0"/>
               <a:t>Ease of Use</a:t>
             </a:r>
-            <a:endParaRPr lang="en-US" sz="2500" dirty="0"/>
           </a:p>
           <a:p>
             <a:pPr lvl="4" fontAlgn="base"/>
             <a:r>
-              <a:rPr lang="en-US" sz="2800" b="1" dirty="0"/>
+              <a:rPr lang="en-US" b="1" dirty="0"/>
               <a:t>Simplicity:</a:t>
             </a:r>
             <a:r>
-              <a:rPr lang="en-US" sz="2800" dirty="0"/>
+              <a:rPr lang="en-US" dirty="0"/>
               <a:t> Making the service open and accessible without authentication can attract more users due to its ease of use.</a:t>
             </a:r>
           </a:p>
           <a:p>
             <a:pPr lvl="4" fontAlgn="base"/>
             <a:r>
-              <a:rPr lang="en-US" sz="2800" b="1" dirty="0"/>
+              <a:rPr lang="en-US" b="1" dirty="0"/>
               <a:t>No Barriers:</a:t>
             </a:r>
             <a:r>
-              <a:rPr lang="en-US" sz="2800" dirty="0"/>
+              <a:rPr lang="en-US" dirty="0"/>
               <a:t> Users can quickly shorten or decode URLs without needing to create an account or log in.</a:t>
             </a:r>
-            <a:endParaRPr lang="en-US" sz="2500" dirty="0"/>
           </a:p>
           <a:p>
             <a:pPr lvl="3" fontAlgn="base"/>
             <a:r>
-              <a:rPr lang="en-US" sz="2800" dirty="0"/>
+              <a:rPr lang="en-US" dirty="0"/>
               <a:t>Public Services</a:t>
             </a:r>
-            <a:endParaRPr lang="en-US" sz="2500" dirty="0"/>
           </a:p>
           <a:p>
             <a:pPr lvl="4" fontAlgn="base"/>
             <a:r>
-              <a:rPr lang="en-US" sz="2800" b="1" dirty="0"/>
+              <a:rPr lang="en-US" b="1" dirty="0"/>
               <a:t>Open Access:</a:t>
             </a:r>
             <a:r>
-              <a:rPr lang="en-US" sz="2800" dirty="0"/>
+              <a:rPr lang="en-US" dirty="0"/>
               <a:t> If the service is intended to be a public utility (e.g., for educational purposes or general public use), requiring authentication may be unnecessary and hinder adoption.</a:t>
             </a:r>
-            <a:endParaRPr lang="en-US" sz="2500" dirty="0"/>
           </a:p>
           <a:p>
             <a:pPr lvl="3" fontAlgn="base"/>
             <a:r>
-              <a:rPr lang="en-US" sz="2800" dirty="0"/>
+              <a:rPr lang="en-US" dirty="0"/>
               <a:t>Minimal Security Concerns</a:t>
             </a:r>
-            <a:endParaRPr lang="en-US" sz="2500" dirty="0"/>
           </a:p>
           <a:p>
             <a:pPr lvl="4" fontAlgn="base"/>
             <a:r>
-              <a:rPr lang="en-US" sz="2800" b="1" dirty="0"/>
+              <a:rPr lang="en-US" b="1" dirty="0"/>
               <a:t>Low Risk:</a:t>
             </a:r>
             <a:r>
-              <a:rPr lang="en-US" sz="2800" dirty="0"/>
+              <a:rPr lang="en-US" dirty="0"/>
               <a:t> If the URLs being shortened or decoded are not sensitive or critical, the security concerns may be minimal.</a:t>
             </a:r>
-            <a:endParaRPr lang="en-US" sz="2500" dirty="0"/>
           </a:p>
           <a:p>
             <a:pPr lvl="3" fontAlgn="base"/>
@@ -8176,7 +8205,7 @@
           <p:cNvPr id="2" name="Title 1">
             <a:extLst>
               <a:ext uri="{FF2B5EF4-FFF2-40B4-BE49-F238E27FC236}">
-                <a16:creationId xmlns:a16="http://schemas.microsoft.com/office/drawing/2014/main" id="{B313E4BC-5D80-FB48-B7A4-07423CFA5B4C}"/>
+                <a16:creationId xmlns:a16="http://schemas.microsoft.com/office/drawing/2014/main" id="{32FA1421-6C55-8643-8D4E-51F2AEFB1E38}"/>
               </a:ext>
             </a:extLst>
           </p:cNvPr>
@@ -8195,7 +8224,7 @@
             <a:pPr algn="ctr"/>
             <a:r>
               <a:rPr lang="en-US" dirty="0"/>
-              <a:t>Implementation Details - Encoding</a:t>
+              <a:t>Design Considerations</a:t>
             </a:r>
           </a:p>
         </p:txBody>
@@ -8205,7 +8234,7 @@
           <p:cNvPr id="3" name="Content Placeholder 2">
             <a:extLst>
               <a:ext uri="{FF2B5EF4-FFF2-40B4-BE49-F238E27FC236}">
-                <a16:creationId xmlns:a16="http://schemas.microsoft.com/office/drawing/2014/main" id="{7318D13B-78B9-4B41-805C-88CC5E6490FB}"/>
+                <a16:creationId xmlns:a16="http://schemas.microsoft.com/office/drawing/2014/main" id="{C7FE3350-138C-DF49-A893-54F02D7FECD1}"/>
               </a:ext>
             </a:extLst>
           </p:cNvPr>
@@ -8216,102 +8245,168 @@
             <p:ph idx="1"/>
           </p:nvPr>
         </p:nvSpPr>
-        <p:spPr/>
-        <p:txBody>
-          <a:bodyPr/>
-          <a:lstStyle/>
-          <a:p>
-            <a:pPr fontAlgn="base"/>
-            <a:r>
-              <a:rPr lang="en-US" dirty="0"/>
-              <a:t>Steps to encode a URL: </a:t>
-            </a:r>
-          </a:p>
+        <p:spPr>
+          <a:xfrm>
+            <a:off x="677334" y="2160589"/>
+            <a:ext cx="8596668" cy="4118291"/>
+          </a:xfrm>
+        </p:spPr>
+        <p:txBody>
+          <a:bodyPr>
+            <a:normAutofit fontScale="40000" lnSpcReduction="20000"/>
+          </a:bodyPr>
+          <a:lstStyle/>
           <a:p>
             <a:pPr lvl="1" fontAlgn="base"/>
             <a:r>
-              <a:rPr lang="en-US" dirty="0"/>
-              <a:t>1. Service receives the original URL from the client</a:t>
+              <a:rPr lang="en-US" sz="2900" dirty="0"/>
+              <a:t>Considerations for Scaling</a:t>
             </a:r>
           </a:p>
           <a:p>
             <a:pPr lvl="2" fontAlgn="base"/>
             <a:r>
-              <a:rPr lang="en-US" dirty="0"/>
-              <a:t>Client send POST request with the JSON content.</a:t>
+              <a:rPr lang="en-US" sz="2800" dirty="0"/>
+              <a:t>Database Scaling</a:t>
             </a:r>
           </a:p>
           <a:p>
             <a:pPr lvl="3" fontAlgn="base"/>
             <a:r>
-              <a:rPr lang="en-US" dirty="0"/>
-              <a:t>URL: http://localhost:9000/</a:t>
-            </a:r>
-            <a:r>
-              <a:rPr lang="en-US" dirty="0" err="1"/>
-              <a:t>api</a:t>
-            </a:r>
-            <a:r>
-              <a:rPr lang="en-US" dirty="0"/>
-              <a:t>/v1/encode</a:t>
+              <a:rPr lang="en-US" sz="2800" b="1" dirty="0"/>
+              <a:t>Vertical Scaling</a:t>
+            </a:r>
+            <a:r>
+              <a:rPr lang="en-US" sz="2800" dirty="0"/>
+              <a:t>: Increase the resources (CPU, RAM, storage) of your database server.</a:t>
             </a:r>
           </a:p>
           <a:p>
             <a:pPr lvl="3" fontAlgn="base"/>
             <a:r>
-              <a:rPr lang="en-US" dirty="0"/>
-              <a:t>Data: {"</a:t>
-            </a:r>
-            <a:r>
-              <a:rPr lang="en-US" dirty="0" err="1"/>
-              <a:t>originalUrl</a:t>
-            </a:r>
-            <a:r>
-              <a:rPr lang="en-US" dirty="0"/>
-              <a:t>": </a:t>
-            </a:r>
-            <a:r>
-              <a:rPr lang="en-US" dirty="0">
-                <a:hlinkClick r:id="rId2"/>
-              </a:rPr>
-              <a:t>http://example.com/test</a:t>
-            </a:r>
-            <a:r>
-              <a:rPr lang="en-US" dirty="0"/>
-              <a:t>}</a:t>
-            </a:r>
-          </a:p>
-          <a:p>
-            <a:pPr lvl="1" fontAlgn="base"/>
-            <a:r>
-              <a:rPr lang="en-US" dirty="0"/>
-              <a:t>2. Service generates a unique identifier (ID)</a:t>
-            </a:r>
+              <a:rPr lang="en-US" sz="2800" b="1" dirty="0"/>
+              <a:t>Horizontal Scaling</a:t>
+            </a:r>
+            <a:r>
+              <a:rPr lang="en-US" sz="2800" dirty="0"/>
+              <a:t>: Use database </a:t>
+            </a:r>
+            <a:r>
+              <a:rPr lang="en-US" sz="2800" dirty="0" err="1"/>
+              <a:t>sharding</a:t>
+            </a:r>
+            <a:r>
+              <a:rPr lang="en-US" sz="2800" dirty="0"/>
+              <a:t> to distribute data across multiple servers. Implement a distributed database system like Cassandra or a cloud-based solution like Amazon DynamoDB.</a:t>
+            </a:r>
+          </a:p>
+          <a:p>
+            <a:pPr lvl="3" fontAlgn="base"/>
+            <a:r>
+              <a:rPr lang="en-US" sz="2800" b="1" dirty="0"/>
+              <a:t>Read Replicas</a:t>
+            </a:r>
+            <a:r>
+              <a:rPr lang="en-US" sz="2800" dirty="0"/>
+              <a:t>: Use read replicas to distribute read traffic. This helps to handle a large number of read requests efficiently.</a:t>
+            </a:r>
+            <a:endParaRPr lang="en-US" sz="2600" dirty="0"/>
           </a:p>
           <a:p>
             <a:pPr lvl="2" fontAlgn="base"/>
             <a:r>
-              <a:rPr lang="en-US" dirty="0"/>
-              <a:t>Use </a:t>
-            </a:r>
-            <a:r>
-              <a:rPr lang="en-US" dirty="0" err="1"/>
-              <a:t>AtomicLong</a:t>
-            </a:r>
-            <a:r>
-              <a:rPr lang="en-US" dirty="0"/>
-              <a:t> to generate a thread-safe unique ID.</a:t>
-            </a:r>
-          </a:p>
-          <a:p>
-            <a:endParaRPr lang="en-US" dirty="0"/>
+              <a:rPr lang="en-US" sz="2800" dirty="0"/>
+              <a:t>Caching</a:t>
+            </a:r>
+          </a:p>
+          <a:p>
+            <a:pPr lvl="3" fontAlgn="base"/>
+            <a:r>
+              <a:rPr lang="en-US" sz="2800" b="1" dirty="0"/>
+              <a:t>In-Memory Caching</a:t>
+            </a:r>
+            <a:r>
+              <a:rPr lang="en-US" sz="2800" dirty="0"/>
+              <a:t>: Use </a:t>
+            </a:r>
+            <a:r>
+              <a:rPr lang="en-US" sz="2800" dirty="0" err="1"/>
+              <a:t>Redis</a:t>
+            </a:r>
+            <a:r>
+              <a:rPr lang="en-US" sz="2800" dirty="0"/>
+              <a:t> or Memcached to cache frequently accessed URLs. This reduces the load on the database.</a:t>
+            </a:r>
+          </a:p>
+          <a:p>
+            <a:pPr lvl="3" fontAlgn="base"/>
+            <a:r>
+              <a:rPr lang="en-US" sz="2800" b="1" dirty="0"/>
+              <a:t>HTTP Caching</a:t>
+            </a:r>
+            <a:r>
+              <a:rPr lang="en-US" sz="2800" dirty="0"/>
+              <a:t>: Use HTTP caching headers to enable client-side caching, which reduces server load.</a:t>
+            </a:r>
+            <a:endParaRPr lang="en-US" sz="2600" dirty="0"/>
+          </a:p>
+          <a:p>
+            <a:pPr lvl="2" fontAlgn="base"/>
+            <a:r>
+              <a:rPr lang="en-US" sz="2800" dirty="0"/>
+              <a:t>Load Balancing</a:t>
+            </a:r>
+          </a:p>
+          <a:p>
+            <a:pPr lvl="3" fontAlgn="base"/>
+            <a:r>
+              <a:rPr lang="en-US" sz="2800" b="1" dirty="0"/>
+              <a:t>Application Load Balancing</a:t>
+            </a:r>
+            <a:r>
+              <a:rPr lang="en-US" sz="2800" dirty="0"/>
+              <a:t>: Use load balancers (e.g., AWS Elastic Load Balancing, Nginx, </a:t>
+            </a:r>
+            <a:r>
+              <a:rPr lang="en-US" sz="2800" dirty="0" err="1"/>
+              <a:t>HAProxy</a:t>
+            </a:r>
+            <a:r>
+              <a:rPr lang="en-US" sz="2800" dirty="0"/>
+              <a:t>) to distribute incoming traffic across multiple application servers.</a:t>
+            </a:r>
+          </a:p>
+          <a:p>
+            <a:pPr lvl="3" fontAlgn="base"/>
+            <a:r>
+              <a:rPr lang="en-US" sz="2800" b="1" dirty="0"/>
+              <a:t>Database Load Balancing</a:t>
+            </a:r>
+            <a:r>
+              <a:rPr lang="en-US" sz="2800" dirty="0"/>
+              <a:t>: Distribute database queries among multiple database servers to avoid bottlenecks.</a:t>
+            </a:r>
+            <a:endParaRPr lang="en-US" sz="2600" dirty="0"/>
+          </a:p>
+          <a:p>
+            <a:pPr lvl="2" fontAlgn="base"/>
+            <a:endParaRPr lang="en-US" sz="2600" dirty="0"/>
+          </a:p>
+          <a:p>
+            <a:pPr marL="0" indent="0">
+              <a:buNone/>
+            </a:pPr>
+            <a:r>
+              <a:rPr lang="en-US" dirty="0"/>
+              <a:t>			</a:t>
+            </a:r>
           </a:p>
         </p:txBody>
       </p:sp>
     </p:spTree>
     <p:extLst>
       <p:ext uri="{BB962C8B-B14F-4D97-AF65-F5344CB8AC3E}">
-        <p14:creationId xmlns:p14="http://schemas.microsoft.com/office/powerpoint/2010/main" val="1148222064"/>
+        <p14:creationId xmlns:p14="http://schemas.microsoft.com/office/powerpoint/2010/main" val="1030293763"/>
       </p:ext>
     </p:extLst>
   </p:cSld>
@@ -8470,6 +8565,375 @@
           <p:cNvPr id="2" name="Title 1">
             <a:extLst>
               <a:ext uri="{FF2B5EF4-FFF2-40B4-BE49-F238E27FC236}">
+                <a16:creationId xmlns:a16="http://schemas.microsoft.com/office/drawing/2014/main" id="{32FA1421-6C55-8643-8D4E-51F2AEFB1E38}"/>
+              </a:ext>
+            </a:extLst>
+          </p:cNvPr>
+          <p:cNvSpPr>
+            <a:spLocks noGrp="1"/>
+          </p:cNvSpPr>
+          <p:nvPr>
+            <p:ph type="title"/>
+          </p:nvPr>
+        </p:nvSpPr>
+        <p:spPr/>
+        <p:txBody>
+          <a:bodyPr/>
+          <a:lstStyle/>
+          <a:p>
+            <a:pPr algn="ctr"/>
+            <a:r>
+              <a:rPr lang="en-US" dirty="0"/>
+              <a:t>Design Considerations</a:t>
+            </a:r>
+          </a:p>
+        </p:txBody>
+      </p:sp>
+      <p:sp>
+        <p:nvSpPr>
+          <p:cNvPr id="3" name="Content Placeholder 2">
+            <a:extLst>
+              <a:ext uri="{FF2B5EF4-FFF2-40B4-BE49-F238E27FC236}">
+                <a16:creationId xmlns:a16="http://schemas.microsoft.com/office/drawing/2014/main" id="{C7FE3350-138C-DF49-A893-54F02D7FECD1}"/>
+              </a:ext>
+            </a:extLst>
+          </p:cNvPr>
+          <p:cNvSpPr>
+            <a:spLocks noGrp="1"/>
+          </p:cNvSpPr>
+          <p:nvPr>
+            <p:ph idx="1"/>
+          </p:nvPr>
+        </p:nvSpPr>
+        <p:spPr>
+          <a:xfrm>
+            <a:off x="677334" y="2160589"/>
+            <a:ext cx="8596668" cy="4118291"/>
+          </a:xfrm>
+        </p:spPr>
+        <p:txBody>
+          <a:bodyPr>
+            <a:normAutofit/>
+          </a:bodyPr>
+          <a:lstStyle/>
+          <a:p>
+            <a:pPr lvl="1" fontAlgn="base"/>
+            <a:r>
+              <a:rPr lang="en-US" sz="1200" dirty="0"/>
+              <a:t>Considerations for Scaling</a:t>
+            </a:r>
+          </a:p>
+          <a:p>
+            <a:pPr lvl="2" fontAlgn="base"/>
+            <a:r>
+              <a:rPr lang="en-US" sz="1100" dirty="0"/>
+              <a:t>Data Partitioning</a:t>
+            </a:r>
+          </a:p>
+          <a:p>
+            <a:pPr lvl="3" fontAlgn="base"/>
+            <a:r>
+              <a:rPr lang="en-US" sz="1100" b="1" dirty="0" err="1"/>
+              <a:t>Sharding</a:t>
+            </a:r>
+            <a:r>
+              <a:rPr lang="en-US" sz="1100" dirty="0"/>
+              <a:t>: Distribute the URLs across multiple shards based on the URL hash or another partitioning key.</a:t>
+            </a:r>
+          </a:p>
+          <a:p>
+            <a:pPr lvl="3" fontAlgn="base"/>
+            <a:r>
+              <a:rPr lang="en-US" sz="1100" b="1" dirty="0"/>
+              <a:t>Consistent Hashing</a:t>
+            </a:r>
+            <a:r>
+              <a:rPr lang="en-US" sz="1100" dirty="0"/>
+              <a:t>: Use consistent hashing to ensure even distribution of URLs across servers, and to minimize the impact of adding/removing servers.</a:t>
+            </a:r>
+          </a:p>
+          <a:p>
+            <a:pPr lvl="2" fontAlgn="base"/>
+            <a:r>
+              <a:rPr lang="en-US" sz="1100" dirty="0"/>
+              <a:t>Auto-Scaling</a:t>
+            </a:r>
+          </a:p>
+          <a:p>
+            <a:pPr lvl="3" fontAlgn="base"/>
+            <a:r>
+              <a:rPr lang="en-US" sz="1100" b="1" dirty="0"/>
+              <a:t>Dynamic Scaling</a:t>
+            </a:r>
+            <a:r>
+              <a:rPr lang="en-US" sz="1100" dirty="0"/>
+              <a:t>: Use cloud provider auto-scaling features (e.g., AWS Auto Scaling, Google Cloud Auto Scaling) to automatically scale the number of servers based on traffic.</a:t>
+            </a:r>
+          </a:p>
+          <a:p>
+            <a:pPr lvl="2" fontAlgn="base"/>
+            <a:r>
+              <a:rPr lang="en-US" sz="1100" dirty="0"/>
+              <a:t>Optimizing URL Lookup</a:t>
+            </a:r>
+          </a:p>
+          <a:p>
+            <a:pPr lvl="3" fontAlgn="base"/>
+            <a:r>
+              <a:rPr lang="en-US" sz="1100" b="1" dirty="0"/>
+              <a:t>Indexing</a:t>
+            </a:r>
+            <a:r>
+              <a:rPr lang="en-US" sz="1100" dirty="0"/>
+              <a:t>: Ensure that the database indexes the shortened URL codes to speed up lookups.</a:t>
+            </a:r>
+          </a:p>
+          <a:p>
+            <a:pPr lvl="3" fontAlgn="base"/>
+            <a:r>
+              <a:rPr lang="en-US" sz="1100" b="1" dirty="0"/>
+              <a:t>NoSQL Databases</a:t>
+            </a:r>
+            <a:r>
+              <a:rPr lang="en-US" sz="1100" dirty="0"/>
+              <a:t>: Use a NoSQL database like </a:t>
+            </a:r>
+            <a:r>
+              <a:rPr lang="en-US" sz="1100" dirty="0" err="1"/>
+              <a:t>Redis</a:t>
+            </a:r>
+            <a:r>
+              <a:rPr lang="en-US" sz="1100" dirty="0"/>
+              <a:t> for fast key-value lookups.</a:t>
+            </a:r>
+          </a:p>
+          <a:p>
+            <a:pPr marL="0" indent="0">
+              <a:buNone/>
+            </a:pPr>
+            <a:r>
+              <a:rPr lang="en-US" dirty="0"/>
+              <a:t>			</a:t>
+            </a:r>
+          </a:p>
+        </p:txBody>
+      </p:sp>
+    </p:spTree>
+    <p:extLst>
+      <p:ext uri="{BB962C8B-B14F-4D97-AF65-F5344CB8AC3E}">
+        <p14:creationId xmlns:p14="http://schemas.microsoft.com/office/powerpoint/2010/main" val="1844413523"/>
+      </p:ext>
+    </p:extLst>
+  </p:cSld>
+  <p:clrMapOvr>
+    <a:masterClrMapping/>
+  </p:clrMapOvr>
+</p:sld>
+</file>
+
+<file path=ppt/slides/slide21.xml><?xml version="1.0" encoding="utf-8"?>
+<p:sld xmlns:a="http://schemas.openxmlformats.org/drawingml/2006/main" xmlns:r="http://schemas.openxmlformats.org/officeDocument/2006/relationships" xmlns:p="http://schemas.openxmlformats.org/presentationml/2006/main">
+  <p:cSld>
+    <p:spTree>
+      <p:nvGrpSpPr>
+        <p:cNvPr id="1" name=""/>
+        <p:cNvGrpSpPr/>
+        <p:nvPr/>
+      </p:nvGrpSpPr>
+      <p:grpSpPr>
+        <a:xfrm>
+          <a:off x="0" y="0"/>
+          <a:ext cx="0" cy="0"/>
+          <a:chOff x="0" y="0"/>
+          <a:chExt cx="0" cy="0"/>
+        </a:xfrm>
+      </p:grpSpPr>
+      <p:sp>
+        <p:nvSpPr>
+          <p:cNvPr id="2" name="Title 1">
+            <a:extLst>
+              <a:ext uri="{FF2B5EF4-FFF2-40B4-BE49-F238E27FC236}">
+                <a16:creationId xmlns:a16="http://schemas.microsoft.com/office/drawing/2014/main" id="{32FA1421-6C55-8643-8D4E-51F2AEFB1E38}"/>
+              </a:ext>
+            </a:extLst>
+          </p:cNvPr>
+          <p:cNvSpPr>
+            <a:spLocks noGrp="1"/>
+          </p:cNvSpPr>
+          <p:nvPr>
+            <p:ph type="title"/>
+          </p:nvPr>
+        </p:nvSpPr>
+        <p:spPr/>
+        <p:txBody>
+          <a:bodyPr/>
+          <a:lstStyle/>
+          <a:p>
+            <a:pPr algn="ctr"/>
+            <a:r>
+              <a:rPr lang="en-US" dirty="0"/>
+              <a:t>Design Considerations</a:t>
+            </a:r>
+          </a:p>
+        </p:txBody>
+      </p:sp>
+      <p:sp>
+        <p:nvSpPr>
+          <p:cNvPr id="3" name="Content Placeholder 2">
+            <a:extLst>
+              <a:ext uri="{FF2B5EF4-FFF2-40B4-BE49-F238E27FC236}">
+                <a16:creationId xmlns:a16="http://schemas.microsoft.com/office/drawing/2014/main" id="{C7FE3350-138C-DF49-A893-54F02D7FECD1}"/>
+              </a:ext>
+            </a:extLst>
+          </p:cNvPr>
+          <p:cNvSpPr>
+            <a:spLocks noGrp="1"/>
+          </p:cNvSpPr>
+          <p:nvPr>
+            <p:ph idx="1"/>
+          </p:nvPr>
+        </p:nvSpPr>
+        <p:spPr>
+          <a:xfrm>
+            <a:off x="677334" y="2160589"/>
+            <a:ext cx="8596668" cy="4118291"/>
+          </a:xfrm>
+        </p:spPr>
+        <p:txBody>
+          <a:bodyPr>
+            <a:normAutofit/>
+          </a:bodyPr>
+          <a:lstStyle/>
+          <a:p>
+            <a:pPr lvl="1" fontAlgn="base"/>
+            <a:r>
+              <a:rPr lang="en-US" sz="1200" dirty="0"/>
+              <a:t>Considerations for Scaling</a:t>
+            </a:r>
+          </a:p>
+          <a:p>
+            <a:pPr lvl="2" fontAlgn="base"/>
+            <a:r>
+              <a:rPr lang="en-US" sz="1100" dirty="0"/>
+              <a:t>Security and Reliability</a:t>
+            </a:r>
+          </a:p>
+          <a:p>
+            <a:pPr lvl="3" fontAlgn="base"/>
+            <a:r>
+              <a:rPr lang="en-US" sz="1100" b="1" dirty="0"/>
+              <a:t>Rate Limiting</a:t>
+            </a:r>
+            <a:r>
+              <a:rPr lang="en-US" sz="1100" dirty="0"/>
+              <a:t>: Implement rate limiting to prevent abuse and reduce the load from malicious users.</a:t>
+            </a:r>
+          </a:p>
+          <a:p>
+            <a:pPr lvl="3" fontAlgn="base"/>
+            <a:r>
+              <a:rPr lang="en-US" sz="1100" b="1" dirty="0"/>
+              <a:t>Data Backups</a:t>
+            </a:r>
+            <a:r>
+              <a:rPr lang="en-US" sz="1100" dirty="0"/>
+              <a:t>: Regularly back up your data to prevent data loss.</a:t>
+            </a:r>
+          </a:p>
+          <a:p>
+            <a:pPr lvl="3" fontAlgn="base"/>
+            <a:r>
+              <a:rPr lang="en-US" sz="1100" b="1" dirty="0"/>
+              <a:t>Monitoring and Alerts</a:t>
+            </a:r>
+            <a:r>
+              <a:rPr lang="en-US" sz="1100" dirty="0"/>
+              <a:t>: Use monitoring tools (e.g., Prometheus, Grafana) to keep track of system performance and set up alerts for potential issues.</a:t>
+            </a:r>
+          </a:p>
+          <a:p>
+            <a:pPr lvl="2" fontAlgn="base"/>
+            <a:r>
+              <a:rPr lang="en-US" sz="1100" dirty="0"/>
+              <a:t>Service Layer Scaling</a:t>
+            </a:r>
+          </a:p>
+          <a:p>
+            <a:pPr lvl="3" fontAlgn="base"/>
+            <a:r>
+              <a:rPr lang="en-US" sz="1100" b="1" dirty="0"/>
+              <a:t>Microservices Architecture</a:t>
+            </a:r>
+            <a:r>
+              <a:rPr lang="en-US" sz="1100" dirty="0"/>
+              <a:t>: Break down the URL </a:t>
+            </a:r>
+            <a:r>
+              <a:rPr lang="en-US" sz="1100" dirty="0" err="1"/>
+              <a:t>shortener</a:t>
+            </a:r>
+            <a:r>
+              <a:rPr lang="en-US" sz="1100" dirty="0"/>
+              <a:t> into microservices (e.g., shortening URL creation). This allows independent scaling of different components.</a:t>
+            </a:r>
+          </a:p>
+          <a:p>
+            <a:pPr lvl="3" fontAlgn="base"/>
+            <a:r>
+              <a:rPr lang="en-US" sz="1100" b="1" dirty="0"/>
+              <a:t>Containerization</a:t>
+            </a:r>
+            <a:r>
+              <a:rPr lang="en-US" sz="1100" dirty="0"/>
+              <a:t>: Use Docker to containerize your services, and Kubernetes to orchestrate and scale your containers.</a:t>
+            </a:r>
+          </a:p>
+          <a:p>
+            <a:pPr marL="0" indent="0">
+              <a:buNone/>
+            </a:pPr>
+            <a:r>
+              <a:rPr lang="en-US" dirty="0"/>
+              <a:t>			</a:t>
+            </a:r>
+          </a:p>
+        </p:txBody>
+      </p:sp>
+    </p:spTree>
+    <p:extLst>
+      <p:ext uri="{BB962C8B-B14F-4D97-AF65-F5344CB8AC3E}">
+        <p14:creationId xmlns:p14="http://schemas.microsoft.com/office/powerpoint/2010/main" val="3816290935"/>
+      </p:ext>
+    </p:extLst>
+  </p:cSld>
+  <p:clrMapOvr>
+    <a:masterClrMapping/>
+  </p:clrMapOvr>
+</p:sld>
+</file>
+
+<file path=ppt/slides/slide22.xml><?xml version="1.0" encoding="utf-8"?>
+<p:sld xmlns:a="http://schemas.openxmlformats.org/drawingml/2006/main" xmlns:r="http://schemas.openxmlformats.org/officeDocument/2006/relationships" xmlns:p="http://schemas.openxmlformats.org/presentationml/2006/main">
+  <p:cSld>
+    <p:spTree>
+      <p:nvGrpSpPr>
+        <p:cNvPr id="1" name=""/>
+        <p:cNvGrpSpPr/>
+        <p:nvPr/>
+      </p:nvGrpSpPr>
+      <p:grpSpPr>
+        <a:xfrm>
+          <a:off x="0" y="0"/>
+          <a:ext cx="0" cy="0"/>
+          <a:chOff x="0" y="0"/>
+          <a:chExt cx="0" cy="0"/>
+        </a:xfrm>
+      </p:grpSpPr>
+      <p:sp>
+        <p:nvSpPr>
+          <p:cNvPr id="2" name="Title 1">
+            <a:extLst>
+              <a:ext uri="{FF2B5EF4-FFF2-40B4-BE49-F238E27FC236}">
                 <a16:creationId xmlns:a16="http://schemas.microsoft.com/office/drawing/2014/main" id="{B313E4BC-5D80-FB48-B7A4-07423CFA5B4C}"/>
               </a:ext>
             </a:extLst>
@@ -8512,6 +8976,173 @@
         </p:nvSpPr>
         <p:spPr/>
         <p:txBody>
+          <a:bodyPr/>
+          <a:lstStyle/>
+          <a:p>
+            <a:pPr fontAlgn="base"/>
+            <a:r>
+              <a:rPr lang="en-US" dirty="0"/>
+              <a:t>Steps to encode a URL: </a:t>
+            </a:r>
+          </a:p>
+          <a:p>
+            <a:pPr lvl="1" fontAlgn="base"/>
+            <a:r>
+              <a:rPr lang="en-US" dirty="0"/>
+              <a:t>1. Service receives the original URL from the client</a:t>
+            </a:r>
+          </a:p>
+          <a:p>
+            <a:pPr lvl="2" fontAlgn="base"/>
+            <a:r>
+              <a:rPr lang="en-US" dirty="0"/>
+              <a:t>Client send POST request with the JSON content.</a:t>
+            </a:r>
+          </a:p>
+          <a:p>
+            <a:pPr lvl="3" fontAlgn="base"/>
+            <a:r>
+              <a:rPr lang="en-US" dirty="0"/>
+              <a:t>URL: http://localhost:9000/</a:t>
+            </a:r>
+            <a:r>
+              <a:rPr lang="en-US" dirty="0" err="1"/>
+              <a:t>api</a:t>
+            </a:r>
+            <a:r>
+              <a:rPr lang="en-US" dirty="0"/>
+              <a:t>/v1/encode</a:t>
+            </a:r>
+          </a:p>
+          <a:p>
+            <a:pPr lvl="3" fontAlgn="base"/>
+            <a:r>
+              <a:rPr lang="en-US" dirty="0"/>
+              <a:t>Data: {"</a:t>
+            </a:r>
+            <a:r>
+              <a:rPr lang="en-US" dirty="0" err="1"/>
+              <a:t>originalUrl</a:t>
+            </a:r>
+            <a:r>
+              <a:rPr lang="en-US" dirty="0"/>
+              <a:t>": </a:t>
+            </a:r>
+            <a:r>
+              <a:rPr lang="en-US" dirty="0">
+                <a:hlinkClick r:id="rId2"/>
+              </a:rPr>
+              <a:t>http://example.com/test</a:t>
+            </a:r>
+            <a:r>
+              <a:rPr lang="en-US" dirty="0"/>
+              <a:t>}</a:t>
+            </a:r>
+          </a:p>
+          <a:p>
+            <a:pPr lvl="1" fontAlgn="base"/>
+            <a:r>
+              <a:rPr lang="en-US" dirty="0"/>
+              <a:t>2. Service generates a unique identifier (ID)</a:t>
+            </a:r>
+          </a:p>
+          <a:p>
+            <a:pPr lvl="2" fontAlgn="base"/>
+            <a:r>
+              <a:rPr lang="en-US" dirty="0"/>
+              <a:t>Use </a:t>
+            </a:r>
+            <a:r>
+              <a:rPr lang="en-US" dirty="0" err="1"/>
+              <a:t>AtomicLong</a:t>
+            </a:r>
+            <a:r>
+              <a:rPr lang="en-US" dirty="0"/>
+              <a:t> to generate a thread-safe unique ID.</a:t>
+            </a:r>
+          </a:p>
+          <a:p>
+            <a:endParaRPr lang="en-US" dirty="0"/>
+          </a:p>
+        </p:txBody>
+      </p:sp>
+    </p:spTree>
+    <p:extLst>
+      <p:ext uri="{BB962C8B-B14F-4D97-AF65-F5344CB8AC3E}">
+        <p14:creationId xmlns:p14="http://schemas.microsoft.com/office/powerpoint/2010/main" val="1148222064"/>
+      </p:ext>
+    </p:extLst>
+  </p:cSld>
+  <p:clrMapOvr>
+    <a:masterClrMapping/>
+  </p:clrMapOvr>
+</p:sld>
+</file>
+
+<file path=ppt/slides/slide23.xml><?xml version="1.0" encoding="utf-8"?>
+<p:sld xmlns:a="http://schemas.openxmlformats.org/drawingml/2006/main" xmlns:r="http://schemas.openxmlformats.org/officeDocument/2006/relationships" xmlns:p="http://schemas.openxmlformats.org/presentationml/2006/main">
+  <p:cSld>
+    <p:spTree>
+      <p:nvGrpSpPr>
+        <p:cNvPr id="1" name=""/>
+        <p:cNvGrpSpPr/>
+        <p:nvPr/>
+      </p:nvGrpSpPr>
+      <p:grpSpPr>
+        <a:xfrm>
+          <a:off x="0" y="0"/>
+          <a:ext cx="0" cy="0"/>
+          <a:chOff x="0" y="0"/>
+          <a:chExt cx="0" cy="0"/>
+        </a:xfrm>
+      </p:grpSpPr>
+      <p:sp>
+        <p:nvSpPr>
+          <p:cNvPr id="2" name="Title 1">
+            <a:extLst>
+              <a:ext uri="{FF2B5EF4-FFF2-40B4-BE49-F238E27FC236}">
+                <a16:creationId xmlns:a16="http://schemas.microsoft.com/office/drawing/2014/main" id="{B313E4BC-5D80-FB48-B7A4-07423CFA5B4C}"/>
+              </a:ext>
+            </a:extLst>
+          </p:cNvPr>
+          <p:cNvSpPr>
+            <a:spLocks noGrp="1"/>
+          </p:cNvSpPr>
+          <p:nvPr>
+            <p:ph type="title"/>
+          </p:nvPr>
+        </p:nvSpPr>
+        <p:spPr/>
+        <p:txBody>
+          <a:bodyPr/>
+          <a:lstStyle/>
+          <a:p>
+            <a:pPr algn="ctr"/>
+            <a:r>
+              <a:rPr lang="en-US" dirty="0"/>
+              <a:t>Implementation Details - Encoding</a:t>
+            </a:r>
+          </a:p>
+        </p:txBody>
+      </p:sp>
+      <p:sp>
+        <p:nvSpPr>
+          <p:cNvPr id="3" name="Content Placeholder 2">
+            <a:extLst>
+              <a:ext uri="{FF2B5EF4-FFF2-40B4-BE49-F238E27FC236}">
+                <a16:creationId xmlns:a16="http://schemas.microsoft.com/office/drawing/2014/main" id="{7318D13B-78B9-4B41-805C-88CC5E6490FB}"/>
+              </a:ext>
+            </a:extLst>
+          </p:cNvPr>
+          <p:cNvSpPr>
+            <a:spLocks noGrp="1"/>
+          </p:cNvSpPr>
+          <p:nvPr>
+            <p:ph idx="1"/>
+          </p:nvPr>
+        </p:nvSpPr>
+        <p:spPr/>
+        <p:txBody>
           <a:bodyPr>
             <a:normAutofit fontScale="92500" lnSpcReduction="10000"/>
           </a:bodyPr>
@@ -8520,7 +9151,7 @@
             <a:pPr fontAlgn="base"/>
             <a:r>
               <a:rPr lang="en-US" dirty="0"/>
-              <a:t>Steps to Encode a URL: </a:t>
+              <a:t>Steps to encode a URL: </a:t>
             </a:r>
           </a:p>
           <a:p>
@@ -8626,7 +9257,7 @@
           <p:nvPr>
             <p:extLst>
               <p:ext uri="{D42A27DB-BD31-4B8C-83A1-F6EECF244321}">
-                <p14:modId xmlns:p14="http://schemas.microsoft.com/office/powerpoint/2010/main" val="1546189071"/>
+                <p14:modId xmlns:p14="http://schemas.microsoft.com/office/powerpoint/2010/main" val="1304156629"/>
               </p:ext>
             </p:extLst>
           </p:nvPr>
@@ -8937,7 +9568,7 @@
                           <a:ea typeface="DengXian" panose="02010600030101010101" pitchFamily="2" charset="-122"/>
                           <a:cs typeface="Times New Roman" panose="02020603050405020304" pitchFamily="18" charset="0"/>
                         </a:rPr>
-                        <a:t>Suitable for most general purposes</a:t>
+                        <a:t> Suitable for most general purposes</a:t>
                       </a:r>
                     </a:p>
                   </a:txBody>
@@ -9059,7 +9690,7 @@
 </p:sld>
 </file>
 
-<file path=ppt/slides/slide21.xml><?xml version="1.0" encoding="utf-8"?>
+<file path=ppt/slides/slide24.xml><?xml version="1.0" encoding="utf-8"?>
 <p:sld xmlns:a="http://schemas.openxmlformats.org/drawingml/2006/main" xmlns:r="http://schemas.openxmlformats.org/officeDocument/2006/relationships" xmlns:p="http://schemas.openxmlformats.org/presentationml/2006/main">
   <p:cSld>
     <p:spTree>
@@ -9129,7 +9760,7 @@
             <a:pPr fontAlgn="base"/>
             <a:r>
               <a:rPr lang="en-US" dirty="0"/>
-              <a:t>Steps to Encode a URL: </a:t>
+              <a:t>Steps to encode a URL: </a:t>
             </a:r>
           </a:p>
           <a:p>
@@ -9152,6 +9783,18 @@
               <a:rPr lang="en-US" dirty="0"/>
               <a:t>Per requirement, keep the mapping in memory, so we choose HashMap.</a:t>
             </a:r>
+          </a:p>
+          <a:p>
+            <a:pPr lvl="3" fontAlgn="base"/>
+            <a:r>
+              <a:rPr lang="en-US" dirty="0"/>
+              <a:t>HashMap is created in a class that has @Service scope which is a singleton, therefore, it exists for the lifetime of the singleton bean, and thus, effectively, for the lifetime of the application </a:t>
+            </a:r>
+            <a:r>
+              <a:rPr lang="en-US"/>
+              <a:t>context.</a:t>
+            </a:r>
+            <a:endParaRPr lang="en-US" dirty="0"/>
           </a:p>
           <a:p>
             <a:endParaRPr lang="en-US" dirty="0"/>
@@ -9171,7 +9814,7 @@
 </p:sld>
 </file>
 
-<file path=ppt/slides/slide22.xml><?xml version="1.0" encoding="utf-8"?>
+<file path=ppt/slides/slide25.xml><?xml version="1.0" encoding="utf-8"?>
 <p:sld xmlns:a="http://schemas.openxmlformats.org/drawingml/2006/main" xmlns:r="http://schemas.openxmlformats.org/officeDocument/2006/relationships" xmlns:p="http://schemas.openxmlformats.org/presentationml/2006/main">
   <p:cSld>
     <p:spTree>
@@ -9893,7 +10536,7 @@
         <p:spPr/>
         <p:txBody>
           <a:bodyPr>
-            <a:normAutofit fontScale="92500" lnSpcReduction="20000"/>
+            <a:normAutofit fontScale="92500" lnSpcReduction="10000"/>
           </a:bodyPr>
           <a:lstStyle/>
           <a:p>
@@ -9982,10 +10625,7 @@
           </a:p>
           <a:p>
             <a:pPr lvl="3" fontAlgn="base"/>
-            <a:r>
-              <a:rPr lang="en-US" dirty="0"/>
-              <a:t>Incremental Hashing:</a:t>
-            </a:r>
+            <a:endParaRPr lang="en-US" dirty="0"/>
           </a:p>
           <a:p>
             <a:pPr lvl="2" fontAlgn="base"/>

</xml_diff>